<commit_message>
PHP Docs - 22/03/2024
</commit_message>
<xml_diff>
--- a/SEM 6/EDE/EDEEXP12.pptx
+++ b/SEM 6/EDE/EDEEXP12.pptx
@@ -682,6 +682,66 @@
           </a:prstGeom>
         </p:spPr>
       </p:pic>
+      <p:pic>
+        <p:nvPicPr>
+          <p:cNvPr id="6" name="Picture 5">
+            <a:extLst>
+              <a:ext uri="{FF2B5EF4-FFF2-40B4-BE49-F238E27FC236}">
+                <a16:creationId xmlns:a16="http://schemas.microsoft.com/office/drawing/2014/main" id="{A4D3D278-0B3D-4E82-A49E-7F6C830358AE}"/>
+              </a:ext>
+            </a:extLst>
+          </p:cNvPr>
+          <p:cNvPicPr>
+            <a:picLocks noChangeAspect="1"/>
+          </p:cNvPicPr>
+          <p:nvPr/>
+        </p:nvPicPr>
+        <p:blipFill>
+          <a:blip r:embed="rId3"/>
+          <a:stretch>
+            <a:fillRect/>
+          </a:stretch>
+        </p:blipFill>
+        <p:spPr>
+          <a:xfrm>
+            <a:off x="0" y="0"/>
+            <a:ext cx="14630400" cy="8229600"/>
+          </a:xfrm>
+          <a:prstGeom prst="rect">
+            <a:avLst/>
+          </a:prstGeom>
+        </p:spPr>
+      </p:pic>
+      <p:pic>
+        <p:nvPicPr>
+          <p:cNvPr id="8" name="Picture 7">
+            <a:extLst>
+              <a:ext uri="{FF2B5EF4-FFF2-40B4-BE49-F238E27FC236}">
+                <a16:creationId xmlns:a16="http://schemas.microsoft.com/office/drawing/2014/main" id="{612A6548-4916-44CF-8A20-7F75EAE61680}"/>
+              </a:ext>
+            </a:extLst>
+          </p:cNvPr>
+          <p:cNvPicPr>
+            <a:picLocks noChangeAspect="1"/>
+          </p:cNvPicPr>
+          <p:nvPr/>
+        </p:nvPicPr>
+        <p:blipFill>
+          <a:blip r:embed="rId4"/>
+          <a:stretch>
+            <a:fillRect/>
+          </a:stretch>
+        </p:blipFill>
+        <p:spPr>
+          <a:xfrm>
+            <a:off x="0" y="0"/>
+            <a:ext cx="14630400" cy="8229600"/>
+          </a:xfrm>
+          <a:prstGeom prst="rect">
+            <a:avLst/>
+          </a:prstGeom>
+        </p:spPr>
+      </p:pic>
     </p:spTree>
     <p:extLst>
       <p:ext uri="{BB962C8B-B14F-4D97-AF65-F5344CB8AC3E}">
@@ -742,6 +802,36 @@
           </a:prstGeom>
         </p:spPr>
       </p:pic>
+      <p:pic>
+        <p:nvPicPr>
+          <p:cNvPr id="4" name="Picture 3">
+            <a:extLst>
+              <a:ext uri="{FF2B5EF4-FFF2-40B4-BE49-F238E27FC236}">
+                <a16:creationId xmlns:a16="http://schemas.microsoft.com/office/drawing/2014/main" id="{858D9F60-505E-4707-9E92-AAC7E7533D39}"/>
+              </a:ext>
+            </a:extLst>
+          </p:cNvPr>
+          <p:cNvPicPr>
+            <a:picLocks noChangeAspect="1"/>
+          </p:cNvPicPr>
+          <p:nvPr/>
+        </p:nvPicPr>
+        <p:blipFill>
+          <a:blip r:embed="rId3"/>
+          <a:stretch>
+            <a:fillRect/>
+          </a:stretch>
+        </p:blipFill>
+        <p:spPr>
+          <a:xfrm>
+            <a:off x="0" y="0"/>
+            <a:ext cx="14630400" cy="8229600"/>
+          </a:xfrm>
+          <a:prstGeom prst="rect">
+            <a:avLst/>
+          </a:prstGeom>
+        </p:spPr>
+      </p:pic>
     </p:spTree>
     <p:extLst>
       <p:ext uri="{BB962C8B-B14F-4D97-AF65-F5344CB8AC3E}">
@@ -818,6 +908,36 @@
         </p:nvPicPr>
         <p:blipFill>
           <a:blip r:embed="rId3"/>
+          <a:stretch>
+            <a:fillRect/>
+          </a:stretch>
+        </p:blipFill>
+        <p:spPr>
+          <a:xfrm>
+            <a:off x="0" y="0"/>
+            <a:ext cx="14630400" cy="8229600"/>
+          </a:xfrm>
+          <a:prstGeom prst="rect">
+            <a:avLst/>
+          </a:prstGeom>
+        </p:spPr>
+      </p:pic>
+      <p:pic>
+        <p:nvPicPr>
+          <p:cNvPr id="4" name="Picture 3">
+            <a:extLst>
+              <a:ext uri="{FF2B5EF4-FFF2-40B4-BE49-F238E27FC236}">
+                <a16:creationId xmlns:a16="http://schemas.microsoft.com/office/drawing/2014/main" id="{C3E46F23-E5F5-4963-B6A6-BC03CA699EEB}"/>
+              </a:ext>
+            </a:extLst>
+          </p:cNvPr>
+          <p:cNvPicPr>
+            <a:picLocks noChangeAspect="1"/>
+          </p:cNvPicPr>
+          <p:nvPr/>
+        </p:nvPicPr>
+        <p:blipFill>
+          <a:blip r:embed="rId4"/>
           <a:stretch>
             <a:fillRect/>
           </a:stretch>
@@ -1064,6 +1184,36 @@
           </a:prstGeom>
         </p:spPr>
       </p:pic>
+      <p:pic>
+        <p:nvPicPr>
+          <p:cNvPr id="4" name="Picture 3">
+            <a:extLst>
+              <a:ext uri="{FF2B5EF4-FFF2-40B4-BE49-F238E27FC236}">
+                <a16:creationId xmlns:a16="http://schemas.microsoft.com/office/drawing/2014/main" id="{4945B53A-8F64-4340-A76F-BAEB8096EB6C}"/>
+              </a:ext>
+            </a:extLst>
+          </p:cNvPr>
+          <p:cNvPicPr>
+            <a:picLocks noChangeAspect="1"/>
+          </p:cNvPicPr>
+          <p:nvPr/>
+        </p:nvPicPr>
+        <p:blipFill>
+          <a:blip r:embed="rId3"/>
+          <a:stretch>
+            <a:fillRect/>
+          </a:stretch>
+        </p:blipFill>
+        <p:spPr>
+          <a:xfrm>
+            <a:off x="0" y="0"/>
+            <a:ext cx="14630400" cy="8229600"/>
+          </a:xfrm>
+          <a:prstGeom prst="rect">
+            <a:avLst/>
+          </a:prstGeom>
+        </p:spPr>
+      </p:pic>
     </p:spTree>
     <p:extLst>
       <p:ext uri="{BB962C8B-B14F-4D97-AF65-F5344CB8AC3E}">
@@ -1124,6 +1274,66 @@
           </a:prstGeom>
         </p:spPr>
       </p:pic>
+      <p:pic>
+        <p:nvPicPr>
+          <p:cNvPr id="4" name="Picture 3">
+            <a:extLst>
+              <a:ext uri="{FF2B5EF4-FFF2-40B4-BE49-F238E27FC236}">
+                <a16:creationId xmlns:a16="http://schemas.microsoft.com/office/drawing/2014/main" id="{2904090F-3D8C-413D-A57A-C78E501D63B2}"/>
+              </a:ext>
+            </a:extLst>
+          </p:cNvPr>
+          <p:cNvPicPr>
+            <a:picLocks noChangeAspect="1"/>
+          </p:cNvPicPr>
+          <p:nvPr/>
+        </p:nvPicPr>
+        <p:blipFill>
+          <a:blip r:embed="rId3"/>
+          <a:stretch>
+            <a:fillRect/>
+          </a:stretch>
+        </p:blipFill>
+        <p:spPr>
+          <a:xfrm>
+            <a:off x="0" y="0"/>
+            <a:ext cx="14630400" cy="8229600"/>
+          </a:xfrm>
+          <a:prstGeom prst="rect">
+            <a:avLst/>
+          </a:prstGeom>
+        </p:spPr>
+      </p:pic>
+      <p:pic>
+        <p:nvPicPr>
+          <p:cNvPr id="6" name="Picture 5">
+            <a:extLst>
+              <a:ext uri="{FF2B5EF4-FFF2-40B4-BE49-F238E27FC236}">
+                <a16:creationId xmlns:a16="http://schemas.microsoft.com/office/drawing/2014/main" id="{7963E31D-ABFB-43E7-BD30-0FD4AC9E5430}"/>
+              </a:ext>
+            </a:extLst>
+          </p:cNvPr>
+          <p:cNvPicPr>
+            <a:picLocks noChangeAspect="1"/>
+          </p:cNvPicPr>
+          <p:nvPr/>
+        </p:nvPicPr>
+        <p:blipFill>
+          <a:blip r:embed="rId4"/>
+          <a:stretch>
+            <a:fillRect/>
+          </a:stretch>
+        </p:blipFill>
+        <p:spPr>
+          <a:xfrm>
+            <a:off x="0" y="0"/>
+            <a:ext cx="14630400" cy="8229600"/>
+          </a:xfrm>
+          <a:prstGeom prst="rect">
+            <a:avLst/>
+          </a:prstGeom>
+        </p:spPr>
+      </p:pic>
     </p:spTree>
     <p:extLst>
       <p:ext uri="{BB962C8B-B14F-4D97-AF65-F5344CB8AC3E}">
@@ -1184,6 +1394,36 @@
           </a:prstGeom>
         </p:spPr>
       </p:pic>
+      <p:pic>
+        <p:nvPicPr>
+          <p:cNvPr id="4" name="Picture 3">
+            <a:extLst>
+              <a:ext uri="{FF2B5EF4-FFF2-40B4-BE49-F238E27FC236}">
+                <a16:creationId xmlns:a16="http://schemas.microsoft.com/office/drawing/2014/main" id="{9ADF8727-8A15-4D58-A145-D5BF5F959D27}"/>
+              </a:ext>
+            </a:extLst>
+          </p:cNvPr>
+          <p:cNvPicPr>
+            <a:picLocks noChangeAspect="1"/>
+          </p:cNvPicPr>
+          <p:nvPr/>
+        </p:nvPicPr>
+        <p:blipFill>
+          <a:blip r:embed="rId3"/>
+          <a:stretch>
+            <a:fillRect/>
+          </a:stretch>
+        </p:blipFill>
+        <p:spPr>
+          <a:xfrm>
+            <a:off x="0" y="0"/>
+            <a:ext cx="14630400" cy="8229600"/>
+          </a:xfrm>
+          <a:prstGeom prst="rect">
+            <a:avLst/>
+          </a:prstGeom>
+        </p:spPr>
+      </p:pic>
     </p:spTree>
     <p:extLst>
       <p:ext uri="{BB962C8B-B14F-4D97-AF65-F5344CB8AC3E}">
@@ -1244,6 +1484,36 @@
           </a:prstGeom>
         </p:spPr>
       </p:pic>
+      <p:pic>
+        <p:nvPicPr>
+          <p:cNvPr id="4" name="Picture 3">
+            <a:extLst>
+              <a:ext uri="{FF2B5EF4-FFF2-40B4-BE49-F238E27FC236}">
+                <a16:creationId xmlns:a16="http://schemas.microsoft.com/office/drawing/2014/main" id="{1EC3FCB5-52D6-4F50-B8CF-C521BBA38FCA}"/>
+              </a:ext>
+            </a:extLst>
+          </p:cNvPr>
+          <p:cNvPicPr>
+            <a:picLocks noChangeAspect="1"/>
+          </p:cNvPicPr>
+          <p:nvPr/>
+        </p:nvPicPr>
+        <p:blipFill>
+          <a:blip r:embed="rId3"/>
+          <a:stretch>
+            <a:fillRect/>
+          </a:stretch>
+        </p:blipFill>
+        <p:spPr>
+          <a:xfrm>
+            <a:off x="0" y="0"/>
+            <a:ext cx="14630400" cy="8229600"/>
+          </a:xfrm>
+          <a:prstGeom prst="rect">
+            <a:avLst/>
+          </a:prstGeom>
+        </p:spPr>
+      </p:pic>
     </p:spTree>
     <p:extLst>
       <p:ext uri="{BB962C8B-B14F-4D97-AF65-F5344CB8AC3E}">
@@ -1304,6 +1574,36 @@
           </a:prstGeom>
         </p:spPr>
       </p:pic>
+      <p:pic>
+        <p:nvPicPr>
+          <p:cNvPr id="4" name="Picture 3">
+            <a:extLst>
+              <a:ext uri="{FF2B5EF4-FFF2-40B4-BE49-F238E27FC236}">
+                <a16:creationId xmlns:a16="http://schemas.microsoft.com/office/drawing/2014/main" id="{87D8EF88-9D2C-49AA-AA07-020C2544DBB1}"/>
+              </a:ext>
+            </a:extLst>
+          </p:cNvPr>
+          <p:cNvPicPr>
+            <a:picLocks noChangeAspect="1"/>
+          </p:cNvPicPr>
+          <p:nvPr/>
+        </p:nvPicPr>
+        <p:blipFill>
+          <a:blip r:embed="rId3"/>
+          <a:stretch>
+            <a:fillRect/>
+          </a:stretch>
+        </p:blipFill>
+        <p:spPr>
+          <a:xfrm>
+            <a:off x="0" y="0"/>
+            <a:ext cx="14630400" cy="8229600"/>
+          </a:xfrm>
+          <a:prstGeom prst="rect">
+            <a:avLst/>
+          </a:prstGeom>
+        </p:spPr>
+      </p:pic>
     </p:spTree>
     <p:extLst>
       <p:ext uri="{BB962C8B-B14F-4D97-AF65-F5344CB8AC3E}">
@@ -1364,6 +1664,36 @@
           </a:prstGeom>
         </p:spPr>
       </p:pic>
+      <p:pic>
+        <p:nvPicPr>
+          <p:cNvPr id="4" name="Picture 3">
+            <a:extLst>
+              <a:ext uri="{FF2B5EF4-FFF2-40B4-BE49-F238E27FC236}">
+                <a16:creationId xmlns:a16="http://schemas.microsoft.com/office/drawing/2014/main" id="{37484738-C8D8-4EB5-8AF1-FFBBB594DDFD}"/>
+              </a:ext>
+            </a:extLst>
+          </p:cNvPr>
+          <p:cNvPicPr>
+            <a:picLocks noChangeAspect="1"/>
+          </p:cNvPicPr>
+          <p:nvPr/>
+        </p:nvPicPr>
+        <p:blipFill>
+          <a:blip r:embed="rId3"/>
+          <a:stretch>
+            <a:fillRect/>
+          </a:stretch>
+        </p:blipFill>
+        <p:spPr>
+          <a:xfrm>
+            <a:off x="0" y="10633"/>
+            <a:ext cx="14630400" cy="8229600"/>
+          </a:xfrm>
+          <a:prstGeom prst="rect">
+            <a:avLst/>
+          </a:prstGeom>
+        </p:spPr>
+      </p:pic>
     </p:spTree>
     <p:extLst>
       <p:ext uri="{BB962C8B-B14F-4D97-AF65-F5344CB8AC3E}">
@@ -1424,6 +1754,36 @@
           </a:prstGeom>
         </p:spPr>
       </p:pic>
+      <p:pic>
+        <p:nvPicPr>
+          <p:cNvPr id="4" name="Picture 3">
+            <a:extLst>
+              <a:ext uri="{FF2B5EF4-FFF2-40B4-BE49-F238E27FC236}">
+                <a16:creationId xmlns:a16="http://schemas.microsoft.com/office/drawing/2014/main" id="{FD7C153D-2BC4-486D-852B-04DBB0B74234}"/>
+              </a:ext>
+            </a:extLst>
+          </p:cNvPr>
+          <p:cNvPicPr>
+            <a:picLocks noChangeAspect="1"/>
+          </p:cNvPicPr>
+          <p:nvPr/>
+        </p:nvPicPr>
+        <p:blipFill>
+          <a:blip r:embed="rId3"/>
+          <a:stretch>
+            <a:fillRect/>
+          </a:stretch>
+        </p:blipFill>
+        <p:spPr>
+          <a:xfrm>
+            <a:off x="0" y="0"/>
+            <a:ext cx="14630400" cy="8229600"/>
+          </a:xfrm>
+          <a:prstGeom prst="rect">
+            <a:avLst/>
+          </a:prstGeom>
+        </p:spPr>
+      </p:pic>
     </p:spTree>
     <p:extLst>
       <p:ext uri="{BB962C8B-B14F-4D97-AF65-F5344CB8AC3E}">
@@ -1484,6 +1844,36 @@
           </a:prstGeom>
         </p:spPr>
       </p:pic>
+      <p:pic>
+        <p:nvPicPr>
+          <p:cNvPr id="4" name="Picture 3">
+            <a:extLst>
+              <a:ext uri="{FF2B5EF4-FFF2-40B4-BE49-F238E27FC236}">
+                <a16:creationId xmlns:a16="http://schemas.microsoft.com/office/drawing/2014/main" id="{9C177136-8BA2-40CC-800D-8528E0EB9F84}"/>
+              </a:ext>
+            </a:extLst>
+          </p:cNvPr>
+          <p:cNvPicPr>
+            <a:picLocks noChangeAspect="1"/>
+          </p:cNvPicPr>
+          <p:nvPr/>
+        </p:nvPicPr>
+        <p:blipFill>
+          <a:blip r:embed="rId3"/>
+          <a:stretch>
+            <a:fillRect/>
+          </a:stretch>
+        </p:blipFill>
+        <p:spPr>
+          <a:xfrm>
+            <a:off x="0" y="0"/>
+            <a:ext cx="14630400" cy="8229600"/>
+          </a:xfrm>
+          <a:prstGeom prst="rect">
+            <a:avLst/>
+          </a:prstGeom>
+        </p:spPr>
+      </p:pic>
     </p:spTree>
     <p:extLst>
       <p:ext uri="{BB962C8B-B14F-4D97-AF65-F5344CB8AC3E}">
@@ -1537,6 +1927,36 @@
         <p:spPr>
           <a:xfrm>
             <a:off x="10633" y="10633"/>
+            <a:ext cx="14630400" cy="8229600"/>
+          </a:xfrm>
+          <a:prstGeom prst="rect">
+            <a:avLst/>
+          </a:prstGeom>
+        </p:spPr>
+      </p:pic>
+      <p:pic>
+        <p:nvPicPr>
+          <p:cNvPr id="4" name="Picture 3">
+            <a:extLst>
+              <a:ext uri="{FF2B5EF4-FFF2-40B4-BE49-F238E27FC236}">
+                <a16:creationId xmlns:a16="http://schemas.microsoft.com/office/drawing/2014/main" id="{D21CF33E-A907-4D8A-9647-A449B31A2F16}"/>
+              </a:ext>
+            </a:extLst>
+          </p:cNvPr>
+          <p:cNvPicPr>
+            <a:picLocks noChangeAspect="1"/>
+          </p:cNvPicPr>
+          <p:nvPr/>
+        </p:nvPicPr>
+        <p:blipFill>
+          <a:blip r:embed="rId3"/>
+          <a:stretch>
+            <a:fillRect/>
+          </a:stretch>
+        </p:blipFill>
+        <p:spPr>
+          <a:xfrm>
+            <a:off x="0" y="0"/>
             <a:ext cx="14630400" cy="8229600"/>
           </a:xfrm>
           <a:prstGeom prst="rect">

</xml_diff>